<commit_message>
Added workflow (5 steps)
</commit_message>
<xml_diff>
--- a/doc/Cer2016_Femke Thon & Jolien Gay_V1.0.pptx
+++ b/doc/Cer2016_Femke Thon & Jolien Gay_V1.0.pptx
@@ -4,6 +4,9 @@
   <p:sldMasterIdLst>
     <p:sldMasterId id="2147483648" r:id="rId1"/>
   </p:sldMasterIdLst>
+  <p:notesMasterIdLst>
+    <p:notesMasterId r:id="rId18"/>
+  </p:notesMasterIdLst>
   <p:sldIdLst>
     <p:sldId id="256" r:id="rId2"/>
     <p:sldId id="262" r:id="rId3"/>
@@ -13,10 +16,14 @@
     <p:sldId id="258" r:id="rId7"/>
     <p:sldId id="264" r:id="rId8"/>
     <p:sldId id="267" r:id="rId9"/>
-    <p:sldId id="259" r:id="rId10"/>
-    <p:sldId id="260" r:id="rId11"/>
-    <p:sldId id="263" r:id="rId12"/>
-    <p:sldId id="261" r:id="rId13"/>
+    <p:sldId id="268" r:id="rId10"/>
+    <p:sldId id="269" r:id="rId11"/>
+    <p:sldId id="270" r:id="rId12"/>
+    <p:sldId id="271" r:id="rId13"/>
+    <p:sldId id="259" r:id="rId14"/>
+    <p:sldId id="260" r:id="rId15"/>
+    <p:sldId id="263" r:id="rId16"/>
+    <p:sldId id="261" r:id="rId17"/>
   </p:sldIdLst>
   <p:sldSz cx="9144000" cy="6858000" type="screen4x3"/>
   <p:notesSz cx="6858000" cy="9144000"/>
@@ -116,6 +123,994 @@
     </a:lvl9pPr>
   </p:defaultTextStyle>
 </p:presentation>
+</file>
+
+<file path=ppt/notesMasters/notesMaster1.xml><?xml version="1.0" encoding="utf-8"?>
+<p:notesMaster xmlns:a="http://schemas.openxmlformats.org/drawingml/2006/main" xmlns:r="http://schemas.openxmlformats.org/officeDocument/2006/relationships" xmlns:p="http://schemas.openxmlformats.org/presentationml/2006/main">
+  <p:cSld>
+    <p:bg>
+      <p:bgRef idx="1001">
+        <a:schemeClr val="bg1"/>
+      </p:bgRef>
+    </p:bg>
+    <p:spTree>
+      <p:nvGrpSpPr>
+        <p:cNvPr id="1" name=""/>
+        <p:cNvGrpSpPr/>
+        <p:nvPr/>
+      </p:nvGrpSpPr>
+      <p:grpSpPr>
+        <a:xfrm>
+          <a:off x="0" y="0"/>
+          <a:ext cx="0" cy="0"/>
+          <a:chOff x="0" y="0"/>
+          <a:chExt cx="0" cy="0"/>
+        </a:xfrm>
+      </p:grpSpPr>
+      <p:sp>
+        <p:nvSpPr>
+          <p:cNvPr id="2" name="Header Placeholder 1"/>
+          <p:cNvSpPr>
+            <a:spLocks noGrp="1"/>
+          </p:cNvSpPr>
+          <p:nvPr>
+            <p:ph type="hdr" sz="quarter"/>
+          </p:nvPr>
+        </p:nvSpPr>
+        <p:spPr>
+          <a:xfrm>
+            <a:off x="0" y="0"/>
+            <a:ext cx="2971800" cy="457200"/>
+          </a:xfrm>
+          <a:prstGeom prst="rect">
+            <a:avLst/>
+          </a:prstGeom>
+        </p:spPr>
+        <p:txBody>
+          <a:bodyPr vert="horz" lIns="91440" tIns="45720" rIns="91440" bIns="45720" rtlCol="0"/>
+          <a:lstStyle>
+            <a:lvl1pPr algn="l">
+              <a:defRPr sz="1200"/>
+            </a:lvl1pPr>
+          </a:lstStyle>
+          <a:p>
+            <a:endParaRPr lang="en-GB"/>
+          </a:p>
+        </p:txBody>
+      </p:sp>
+      <p:sp>
+        <p:nvSpPr>
+          <p:cNvPr id="3" name="Date Placeholder 2"/>
+          <p:cNvSpPr>
+            <a:spLocks noGrp="1"/>
+          </p:cNvSpPr>
+          <p:nvPr>
+            <p:ph type="dt" idx="1"/>
+          </p:nvPr>
+        </p:nvSpPr>
+        <p:spPr>
+          <a:xfrm>
+            <a:off x="3884613" y="0"/>
+            <a:ext cx="2971800" cy="457200"/>
+          </a:xfrm>
+          <a:prstGeom prst="rect">
+            <a:avLst/>
+          </a:prstGeom>
+        </p:spPr>
+        <p:txBody>
+          <a:bodyPr vert="horz" lIns="91440" tIns="45720" rIns="91440" bIns="45720" rtlCol="0"/>
+          <a:lstStyle>
+            <a:lvl1pPr algn="r">
+              <a:defRPr sz="1200"/>
+            </a:lvl1pPr>
+          </a:lstStyle>
+          <a:p>
+            <a:fld id="{31638245-5222-4875-B595-DAA9E1B2F047}" type="datetimeFigureOut">
+              <a:rPr lang="en-GB" smtClean="0"/>
+              <a:t>12/05/2016</a:t>
+            </a:fld>
+            <a:endParaRPr lang="en-GB"/>
+          </a:p>
+        </p:txBody>
+      </p:sp>
+      <p:sp>
+        <p:nvSpPr>
+          <p:cNvPr id="4" name="Slide Image Placeholder 3"/>
+          <p:cNvSpPr>
+            <a:spLocks noGrp="1" noRot="1" noChangeAspect="1"/>
+          </p:cNvSpPr>
+          <p:nvPr>
+            <p:ph type="sldImg" idx="2"/>
+          </p:nvPr>
+        </p:nvSpPr>
+        <p:spPr>
+          <a:xfrm>
+            <a:off x="1143000" y="685800"/>
+            <a:ext cx="4572000" cy="3429000"/>
+          </a:xfrm>
+          <a:prstGeom prst="rect">
+            <a:avLst/>
+          </a:prstGeom>
+          <a:noFill/>
+          <a:ln w="12700">
+            <a:solidFill>
+              <a:prstClr val="black"/>
+            </a:solidFill>
+          </a:ln>
+        </p:spPr>
+        <p:txBody>
+          <a:bodyPr vert="horz" lIns="91440" tIns="45720" rIns="91440" bIns="45720" rtlCol="0" anchor="ctr"/>
+          <a:lstStyle/>
+          <a:p>
+            <a:endParaRPr lang="en-GB"/>
+          </a:p>
+        </p:txBody>
+      </p:sp>
+      <p:sp>
+        <p:nvSpPr>
+          <p:cNvPr id="5" name="Notes Placeholder 4"/>
+          <p:cNvSpPr>
+            <a:spLocks noGrp="1"/>
+          </p:cNvSpPr>
+          <p:nvPr>
+            <p:ph type="body" sz="quarter" idx="3"/>
+          </p:nvPr>
+        </p:nvSpPr>
+        <p:spPr>
+          <a:xfrm>
+            <a:off x="685800" y="4343400"/>
+            <a:ext cx="5486400" cy="4114800"/>
+          </a:xfrm>
+          <a:prstGeom prst="rect">
+            <a:avLst/>
+          </a:prstGeom>
+        </p:spPr>
+        <p:txBody>
+          <a:bodyPr vert="horz" lIns="91440" tIns="45720" rIns="91440" bIns="45720" rtlCol="0">
+            <a:normAutofit/>
+          </a:bodyPr>
+          <a:lstStyle/>
+          <a:p>
+            <a:pPr lvl="0"/>
+            <a:r>
+              <a:rPr lang="en-US" smtClean="0"/>
+              <a:t>Click to edit Master text styles</a:t>
+            </a:r>
+          </a:p>
+          <a:p>
+            <a:pPr lvl="1"/>
+            <a:r>
+              <a:rPr lang="en-US" smtClean="0"/>
+              <a:t>Second level</a:t>
+            </a:r>
+          </a:p>
+          <a:p>
+            <a:pPr lvl="2"/>
+            <a:r>
+              <a:rPr lang="en-US" smtClean="0"/>
+              <a:t>Third level</a:t>
+            </a:r>
+          </a:p>
+          <a:p>
+            <a:pPr lvl="3"/>
+            <a:r>
+              <a:rPr lang="en-US" smtClean="0"/>
+              <a:t>Fourth level</a:t>
+            </a:r>
+          </a:p>
+          <a:p>
+            <a:pPr lvl="4"/>
+            <a:r>
+              <a:rPr lang="en-US" smtClean="0"/>
+              <a:t>Fifth level</a:t>
+            </a:r>
+            <a:endParaRPr lang="en-GB"/>
+          </a:p>
+        </p:txBody>
+      </p:sp>
+      <p:sp>
+        <p:nvSpPr>
+          <p:cNvPr id="6" name="Footer Placeholder 5"/>
+          <p:cNvSpPr>
+            <a:spLocks noGrp="1"/>
+          </p:cNvSpPr>
+          <p:nvPr>
+            <p:ph type="ftr" sz="quarter" idx="4"/>
+          </p:nvPr>
+        </p:nvSpPr>
+        <p:spPr>
+          <a:xfrm>
+            <a:off x="0" y="8685213"/>
+            <a:ext cx="2971800" cy="457200"/>
+          </a:xfrm>
+          <a:prstGeom prst="rect">
+            <a:avLst/>
+          </a:prstGeom>
+        </p:spPr>
+        <p:txBody>
+          <a:bodyPr vert="horz" lIns="91440" tIns="45720" rIns="91440" bIns="45720" rtlCol="0" anchor="b"/>
+          <a:lstStyle>
+            <a:lvl1pPr algn="l">
+              <a:defRPr sz="1200"/>
+            </a:lvl1pPr>
+          </a:lstStyle>
+          <a:p>
+            <a:endParaRPr lang="en-GB"/>
+          </a:p>
+        </p:txBody>
+      </p:sp>
+      <p:sp>
+        <p:nvSpPr>
+          <p:cNvPr id="7" name="Slide Number Placeholder 6"/>
+          <p:cNvSpPr>
+            <a:spLocks noGrp="1"/>
+          </p:cNvSpPr>
+          <p:nvPr>
+            <p:ph type="sldNum" sz="quarter" idx="5"/>
+          </p:nvPr>
+        </p:nvSpPr>
+        <p:spPr>
+          <a:xfrm>
+            <a:off x="3884613" y="8685213"/>
+            <a:ext cx="2971800" cy="457200"/>
+          </a:xfrm>
+          <a:prstGeom prst="rect">
+            <a:avLst/>
+          </a:prstGeom>
+        </p:spPr>
+        <p:txBody>
+          <a:bodyPr vert="horz" lIns="91440" tIns="45720" rIns="91440" bIns="45720" rtlCol="0" anchor="b"/>
+          <a:lstStyle>
+            <a:lvl1pPr algn="r">
+              <a:defRPr sz="1200"/>
+            </a:lvl1pPr>
+          </a:lstStyle>
+          <a:p>
+            <a:fld id="{9BBE7A90-5B18-44E6-896F-B56F6E25EE11}" type="slidenum">
+              <a:rPr lang="en-GB" smtClean="0"/>
+              <a:t>‹#›</a:t>
+            </a:fld>
+            <a:endParaRPr lang="en-GB"/>
+          </a:p>
+        </p:txBody>
+      </p:sp>
+    </p:spTree>
+  </p:cSld>
+  <p:clrMap bg1="lt1" tx1="dk1" bg2="lt2" tx2="dk2" accent1="accent1" accent2="accent2" accent3="accent3" accent4="accent4" accent5="accent5" accent6="accent6" hlink="hlink" folHlink="folHlink"/>
+  <p:notesStyle>
+    <a:lvl1pPr marL="0" algn="l" defTabSz="914400" rtl="0" eaLnBrk="1" latinLnBrk="0" hangingPunct="1">
+      <a:defRPr sz="1200" kern="1200">
+        <a:solidFill>
+          <a:schemeClr val="tx1"/>
+        </a:solidFill>
+        <a:latin typeface="+mn-lt"/>
+        <a:ea typeface="+mn-ea"/>
+        <a:cs typeface="+mn-cs"/>
+      </a:defRPr>
+    </a:lvl1pPr>
+    <a:lvl2pPr marL="457200" algn="l" defTabSz="914400" rtl="0" eaLnBrk="1" latinLnBrk="0" hangingPunct="1">
+      <a:defRPr sz="1200" kern="1200">
+        <a:solidFill>
+          <a:schemeClr val="tx1"/>
+        </a:solidFill>
+        <a:latin typeface="+mn-lt"/>
+        <a:ea typeface="+mn-ea"/>
+        <a:cs typeface="+mn-cs"/>
+      </a:defRPr>
+    </a:lvl2pPr>
+    <a:lvl3pPr marL="914400" algn="l" defTabSz="914400" rtl="0" eaLnBrk="1" latinLnBrk="0" hangingPunct="1">
+      <a:defRPr sz="1200" kern="1200">
+        <a:solidFill>
+          <a:schemeClr val="tx1"/>
+        </a:solidFill>
+        <a:latin typeface="+mn-lt"/>
+        <a:ea typeface="+mn-ea"/>
+        <a:cs typeface="+mn-cs"/>
+      </a:defRPr>
+    </a:lvl3pPr>
+    <a:lvl4pPr marL="1371600" algn="l" defTabSz="914400" rtl="0" eaLnBrk="1" latinLnBrk="0" hangingPunct="1">
+      <a:defRPr sz="1200" kern="1200">
+        <a:solidFill>
+          <a:schemeClr val="tx1"/>
+        </a:solidFill>
+        <a:latin typeface="+mn-lt"/>
+        <a:ea typeface="+mn-ea"/>
+        <a:cs typeface="+mn-cs"/>
+      </a:defRPr>
+    </a:lvl4pPr>
+    <a:lvl5pPr marL="1828800" algn="l" defTabSz="914400" rtl="0" eaLnBrk="1" latinLnBrk="0" hangingPunct="1">
+      <a:defRPr sz="1200" kern="1200">
+        <a:solidFill>
+          <a:schemeClr val="tx1"/>
+        </a:solidFill>
+        <a:latin typeface="+mn-lt"/>
+        <a:ea typeface="+mn-ea"/>
+        <a:cs typeface="+mn-cs"/>
+      </a:defRPr>
+    </a:lvl5pPr>
+    <a:lvl6pPr marL="2286000" algn="l" defTabSz="914400" rtl="0" eaLnBrk="1" latinLnBrk="0" hangingPunct="1">
+      <a:defRPr sz="1200" kern="1200">
+        <a:solidFill>
+          <a:schemeClr val="tx1"/>
+        </a:solidFill>
+        <a:latin typeface="+mn-lt"/>
+        <a:ea typeface="+mn-ea"/>
+        <a:cs typeface="+mn-cs"/>
+      </a:defRPr>
+    </a:lvl6pPr>
+    <a:lvl7pPr marL="2743200" algn="l" defTabSz="914400" rtl="0" eaLnBrk="1" latinLnBrk="0" hangingPunct="1">
+      <a:defRPr sz="1200" kern="1200">
+        <a:solidFill>
+          <a:schemeClr val="tx1"/>
+        </a:solidFill>
+        <a:latin typeface="+mn-lt"/>
+        <a:ea typeface="+mn-ea"/>
+        <a:cs typeface="+mn-cs"/>
+      </a:defRPr>
+    </a:lvl7pPr>
+    <a:lvl8pPr marL="3200400" algn="l" defTabSz="914400" rtl="0" eaLnBrk="1" latinLnBrk="0" hangingPunct="1">
+      <a:defRPr sz="1200" kern="1200">
+        <a:solidFill>
+          <a:schemeClr val="tx1"/>
+        </a:solidFill>
+        <a:latin typeface="+mn-lt"/>
+        <a:ea typeface="+mn-ea"/>
+        <a:cs typeface="+mn-cs"/>
+      </a:defRPr>
+    </a:lvl8pPr>
+    <a:lvl9pPr marL="3657600" algn="l" defTabSz="914400" rtl="0" eaLnBrk="1" latinLnBrk="0" hangingPunct="1">
+      <a:defRPr sz="1200" kern="1200">
+        <a:solidFill>
+          <a:schemeClr val="tx1"/>
+        </a:solidFill>
+        <a:latin typeface="+mn-lt"/>
+        <a:ea typeface="+mn-ea"/>
+        <a:cs typeface="+mn-cs"/>
+      </a:defRPr>
+    </a:lvl9pPr>
+  </p:notesStyle>
+</p:notesMaster>
+</file>
+
+<file path=ppt/notesSlides/notesSlide1.xml><?xml version="1.0" encoding="utf-8"?>
+<p:notes xmlns:a="http://schemas.openxmlformats.org/drawingml/2006/main" xmlns:r="http://schemas.openxmlformats.org/officeDocument/2006/relationships" xmlns:p="http://schemas.openxmlformats.org/presentationml/2006/main">
+  <p:cSld>
+    <p:spTree>
+      <p:nvGrpSpPr>
+        <p:cNvPr id="1" name=""/>
+        <p:cNvGrpSpPr/>
+        <p:nvPr/>
+      </p:nvGrpSpPr>
+      <p:grpSpPr>
+        <a:xfrm>
+          <a:off x="0" y="0"/>
+          <a:ext cx="0" cy="0"/>
+          <a:chOff x="0" y="0"/>
+          <a:chExt cx="0" cy="0"/>
+        </a:xfrm>
+      </p:grpSpPr>
+      <p:sp>
+        <p:nvSpPr>
+          <p:cNvPr id="2" name="Slide Image Placeholder 1"/>
+          <p:cNvSpPr>
+            <a:spLocks noGrp="1" noRot="1" noChangeAspect="1"/>
+          </p:cNvSpPr>
+          <p:nvPr>
+            <p:ph type="sldImg"/>
+          </p:nvPr>
+        </p:nvSpPr>
+        <p:spPr/>
+      </p:sp>
+      <p:sp>
+        <p:nvSpPr>
+          <p:cNvPr id="3" name="Notes Placeholder 2"/>
+          <p:cNvSpPr>
+            <a:spLocks noGrp="1"/>
+          </p:cNvSpPr>
+          <p:nvPr>
+            <p:ph type="body" idx="1"/>
+          </p:nvPr>
+        </p:nvSpPr>
+        <p:spPr/>
+        <p:txBody>
+          <a:bodyPr>
+            <a:normAutofit/>
+          </a:bodyPr>
+          <a:lstStyle/>
+          <a:p>
+            <a:r>
+              <a:rPr lang="nl-NL" dirty="0" smtClean="0"/>
+              <a:t>NOTE: Some photo’s are placeholders (incomplete</a:t>
+            </a:r>
+            <a:r>
+              <a:rPr lang="nl-NL" baseline="0" dirty="0" smtClean="0"/>
+              <a:t> pics).</a:t>
+            </a:r>
+            <a:endParaRPr lang="en-GB" dirty="0"/>
+          </a:p>
+        </p:txBody>
+      </p:sp>
+      <p:sp>
+        <p:nvSpPr>
+          <p:cNvPr id="4" name="Slide Number Placeholder 3"/>
+          <p:cNvSpPr>
+            <a:spLocks noGrp="1"/>
+          </p:cNvSpPr>
+          <p:nvPr>
+            <p:ph type="sldNum" sz="quarter" idx="10"/>
+          </p:nvPr>
+        </p:nvSpPr>
+        <p:spPr/>
+        <p:txBody>
+          <a:bodyPr/>
+          <a:lstStyle/>
+          <a:p>
+            <a:fld id="{9BBE7A90-5B18-44E6-896F-B56F6E25EE11}" type="slidenum">
+              <a:rPr lang="en-GB" smtClean="0"/>
+              <a:t>1</a:t>
+            </a:fld>
+            <a:endParaRPr lang="en-GB"/>
+          </a:p>
+        </p:txBody>
+      </p:sp>
+    </p:spTree>
+  </p:cSld>
+  <p:clrMapOvr>
+    <a:masterClrMapping/>
+  </p:clrMapOvr>
+</p:notes>
+</file>
+
+<file path=ppt/notesSlides/notesSlide2.xml><?xml version="1.0" encoding="utf-8"?>
+<p:notes xmlns:a="http://schemas.openxmlformats.org/drawingml/2006/main" xmlns:r="http://schemas.openxmlformats.org/officeDocument/2006/relationships" xmlns:p="http://schemas.openxmlformats.org/presentationml/2006/main">
+  <p:cSld>
+    <p:spTree>
+      <p:nvGrpSpPr>
+        <p:cNvPr id="1" name=""/>
+        <p:cNvGrpSpPr/>
+        <p:nvPr/>
+      </p:nvGrpSpPr>
+      <p:grpSpPr>
+        <a:xfrm>
+          <a:off x="0" y="0"/>
+          <a:ext cx="0" cy="0"/>
+          <a:chOff x="0" y="0"/>
+          <a:chExt cx="0" cy="0"/>
+        </a:xfrm>
+      </p:grpSpPr>
+      <p:sp>
+        <p:nvSpPr>
+          <p:cNvPr id="2" name="Slide Image Placeholder 1"/>
+          <p:cNvSpPr>
+            <a:spLocks noGrp="1" noRot="1" noChangeAspect="1"/>
+          </p:cNvSpPr>
+          <p:nvPr>
+            <p:ph type="sldImg"/>
+          </p:nvPr>
+        </p:nvSpPr>
+        <p:spPr/>
+      </p:sp>
+      <p:sp>
+        <p:nvSpPr>
+          <p:cNvPr id="3" name="Notes Placeholder 2"/>
+          <p:cNvSpPr>
+            <a:spLocks noGrp="1"/>
+          </p:cNvSpPr>
+          <p:nvPr>
+            <p:ph type="body" idx="1"/>
+          </p:nvPr>
+        </p:nvSpPr>
+        <p:spPr/>
+        <p:txBody>
+          <a:bodyPr>
+            <a:normAutofit/>
+          </a:bodyPr>
+          <a:lstStyle/>
+          <a:p>
+            <a:r>
+              <a:rPr lang="nl-NL" dirty="0" smtClean="0"/>
+              <a:t>TODO: Add x</a:t>
+            </a:r>
+            <a:r>
+              <a:rPr lang="nl-NL" baseline="0" dirty="0" smtClean="0"/>
+              <a:t> and y label to picture 2 (nLTT plot)</a:t>
+            </a:r>
+            <a:endParaRPr lang="en-GB" dirty="0"/>
+          </a:p>
+        </p:txBody>
+      </p:sp>
+      <p:sp>
+        <p:nvSpPr>
+          <p:cNvPr id="4" name="Slide Number Placeholder 3"/>
+          <p:cNvSpPr>
+            <a:spLocks noGrp="1"/>
+          </p:cNvSpPr>
+          <p:nvPr>
+            <p:ph type="sldNum" sz="quarter" idx="10"/>
+          </p:nvPr>
+        </p:nvSpPr>
+        <p:spPr/>
+        <p:txBody>
+          <a:bodyPr/>
+          <a:lstStyle/>
+          <a:p>
+            <a:fld id="{9BBE7A90-5B18-44E6-896F-B56F6E25EE11}" type="slidenum">
+              <a:rPr lang="en-GB" smtClean="0"/>
+              <a:t>8</a:t>
+            </a:fld>
+            <a:endParaRPr lang="en-GB"/>
+          </a:p>
+        </p:txBody>
+      </p:sp>
+    </p:spTree>
+  </p:cSld>
+  <p:clrMapOvr>
+    <a:masterClrMapping/>
+  </p:clrMapOvr>
+</p:notes>
+</file>
+
+<file path=ppt/notesSlides/notesSlide3.xml><?xml version="1.0" encoding="utf-8"?>
+<p:notes xmlns:a="http://schemas.openxmlformats.org/drawingml/2006/main" xmlns:r="http://schemas.openxmlformats.org/officeDocument/2006/relationships" xmlns:p="http://schemas.openxmlformats.org/presentationml/2006/main">
+  <p:cSld>
+    <p:spTree>
+      <p:nvGrpSpPr>
+        <p:cNvPr id="1" name=""/>
+        <p:cNvGrpSpPr/>
+        <p:nvPr/>
+      </p:nvGrpSpPr>
+      <p:grpSpPr>
+        <a:xfrm>
+          <a:off x="0" y="0"/>
+          <a:ext cx="0" cy="0"/>
+          <a:chOff x="0" y="0"/>
+          <a:chExt cx="0" cy="0"/>
+        </a:xfrm>
+      </p:grpSpPr>
+      <p:sp>
+        <p:nvSpPr>
+          <p:cNvPr id="2" name="Slide Image Placeholder 1"/>
+          <p:cNvSpPr>
+            <a:spLocks noGrp="1" noRot="1" noChangeAspect="1"/>
+          </p:cNvSpPr>
+          <p:nvPr>
+            <p:ph type="sldImg"/>
+          </p:nvPr>
+        </p:nvSpPr>
+        <p:spPr/>
+      </p:sp>
+      <p:sp>
+        <p:nvSpPr>
+          <p:cNvPr id="3" name="Notes Placeholder 2"/>
+          <p:cNvSpPr>
+            <a:spLocks noGrp="1"/>
+          </p:cNvSpPr>
+          <p:nvPr>
+            <p:ph type="body" idx="1"/>
+          </p:nvPr>
+        </p:nvSpPr>
+        <p:spPr/>
+        <p:txBody>
+          <a:bodyPr>
+            <a:normAutofit/>
+          </a:bodyPr>
+          <a:lstStyle/>
+          <a:p>
+            <a:r>
+              <a:rPr lang="nl-NL" dirty="0" smtClean="0"/>
+              <a:t>TODO:</a:t>
+            </a:r>
+            <a:r>
+              <a:rPr lang="nl-NL" baseline="0" dirty="0" smtClean="0"/>
+              <a:t> Make species names better visible </a:t>
+            </a:r>
+          </a:p>
+          <a:p>
+            <a:r>
+              <a:rPr lang="nl-NL" baseline="0" dirty="0" smtClean="0"/>
+              <a:t>TODO: Add clearer title to pictures (Sampled tree 1 and 2)</a:t>
+            </a:r>
+          </a:p>
+          <a:p>
+            <a:endParaRPr lang="en-GB" dirty="0"/>
+          </a:p>
+        </p:txBody>
+      </p:sp>
+      <p:sp>
+        <p:nvSpPr>
+          <p:cNvPr id="4" name="Slide Number Placeholder 3"/>
+          <p:cNvSpPr>
+            <a:spLocks noGrp="1"/>
+          </p:cNvSpPr>
+          <p:nvPr>
+            <p:ph type="sldNum" sz="quarter" idx="10"/>
+          </p:nvPr>
+        </p:nvSpPr>
+        <p:spPr/>
+        <p:txBody>
+          <a:bodyPr/>
+          <a:lstStyle/>
+          <a:p>
+            <a:fld id="{9BBE7A90-5B18-44E6-896F-B56F6E25EE11}" type="slidenum">
+              <a:rPr lang="en-GB" smtClean="0"/>
+              <a:t>9</a:t>
+            </a:fld>
+            <a:endParaRPr lang="en-GB"/>
+          </a:p>
+        </p:txBody>
+      </p:sp>
+    </p:spTree>
+  </p:cSld>
+  <p:clrMapOvr>
+    <a:masterClrMapping/>
+  </p:clrMapOvr>
+</p:notes>
+</file>
+
+<file path=ppt/notesSlides/notesSlide4.xml><?xml version="1.0" encoding="utf-8"?>
+<p:notes xmlns:a="http://schemas.openxmlformats.org/drawingml/2006/main" xmlns:r="http://schemas.openxmlformats.org/officeDocument/2006/relationships" xmlns:p="http://schemas.openxmlformats.org/presentationml/2006/main">
+  <p:cSld>
+    <p:spTree>
+      <p:nvGrpSpPr>
+        <p:cNvPr id="1" name=""/>
+        <p:cNvGrpSpPr/>
+        <p:nvPr/>
+      </p:nvGrpSpPr>
+      <p:grpSpPr>
+        <a:xfrm>
+          <a:off x="0" y="0"/>
+          <a:ext cx="0" cy="0"/>
+          <a:chOff x="0" y="0"/>
+          <a:chExt cx="0" cy="0"/>
+        </a:xfrm>
+      </p:grpSpPr>
+      <p:sp>
+        <p:nvSpPr>
+          <p:cNvPr id="2" name="Slide Image Placeholder 1"/>
+          <p:cNvSpPr>
+            <a:spLocks noGrp="1" noRot="1" noChangeAspect="1"/>
+          </p:cNvSpPr>
+          <p:nvPr>
+            <p:ph type="sldImg"/>
+          </p:nvPr>
+        </p:nvSpPr>
+        <p:spPr/>
+      </p:sp>
+      <p:sp>
+        <p:nvSpPr>
+          <p:cNvPr id="3" name="Notes Placeholder 2"/>
+          <p:cNvSpPr>
+            <a:spLocks noGrp="1"/>
+          </p:cNvSpPr>
+          <p:nvPr>
+            <p:ph type="body" idx="1"/>
+          </p:nvPr>
+        </p:nvSpPr>
+        <p:spPr/>
+        <p:txBody>
+          <a:bodyPr>
+            <a:normAutofit/>
+          </a:bodyPr>
+          <a:lstStyle/>
+          <a:p>
+            <a:r>
+              <a:rPr lang="nl-NL" dirty="0" smtClean="0"/>
+              <a:t>TODO:</a:t>
+            </a:r>
+            <a:r>
+              <a:rPr lang="nl-NL" baseline="0" dirty="0" smtClean="0"/>
+              <a:t> Clearer titles, show that these are 2 random draws sampled tree 1 </a:t>
+            </a:r>
+          </a:p>
+          <a:p>
+            <a:r>
+              <a:rPr lang="nl-NL" baseline="0" dirty="0" smtClean="0"/>
+              <a:t>Q: Should we show the 2 drawn alignments from sampled tree 2 also? Not too much stuff happening in one dia?</a:t>
+            </a:r>
+            <a:endParaRPr lang="en-GB" dirty="0"/>
+          </a:p>
+        </p:txBody>
+      </p:sp>
+      <p:sp>
+        <p:nvSpPr>
+          <p:cNvPr id="4" name="Slide Number Placeholder 3"/>
+          <p:cNvSpPr>
+            <a:spLocks noGrp="1"/>
+          </p:cNvSpPr>
+          <p:nvPr>
+            <p:ph type="sldNum" sz="quarter" idx="10"/>
+          </p:nvPr>
+        </p:nvSpPr>
+        <p:spPr/>
+        <p:txBody>
+          <a:bodyPr/>
+          <a:lstStyle/>
+          <a:p>
+            <a:fld id="{9BBE7A90-5B18-44E6-896F-B56F6E25EE11}" type="slidenum">
+              <a:rPr lang="en-GB" smtClean="0"/>
+              <a:t>10</a:t>
+            </a:fld>
+            <a:endParaRPr lang="en-GB"/>
+          </a:p>
+        </p:txBody>
+      </p:sp>
+    </p:spTree>
+  </p:cSld>
+  <p:clrMapOvr>
+    <a:masterClrMapping/>
+  </p:clrMapOvr>
+</p:notes>
+</file>
+
+<file path=ppt/notesSlides/notesSlide5.xml><?xml version="1.0" encoding="utf-8"?>
+<p:notes xmlns:a="http://schemas.openxmlformats.org/drawingml/2006/main" xmlns:r="http://schemas.openxmlformats.org/officeDocument/2006/relationships" xmlns:p="http://schemas.openxmlformats.org/presentationml/2006/main">
+  <p:cSld>
+    <p:spTree>
+      <p:nvGrpSpPr>
+        <p:cNvPr id="1" name=""/>
+        <p:cNvGrpSpPr/>
+        <p:nvPr/>
+      </p:nvGrpSpPr>
+      <p:grpSpPr>
+        <a:xfrm>
+          <a:off x="0" y="0"/>
+          <a:ext cx="0" cy="0"/>
+          <a:chOff x="0" y="0"/>
+          <a:chExt cx="0" cy="0"/>
+        </a:xfrm>
+      </p:grpSpPr>
+      <p:sp>
+        <p:nvSpPr>
+          <p:cNvPr id="2" name="Slide Image Placeholder 1"/>
+          <p:cNvSpPr>
+            <a:spLocks noGrp="1" noRot="1" noChangeAspect="1"/>
+          </p:cNvSpPr>
+          <p:nvPr>
+            <p:ph type="sldImg"/>
+          </p:nvPr>
+        </p:nvSpPr>
+        <p:spPr/>
+      </p:sp>
+      <p:sp>
+        <p:nvSpPr>
+          <p:cNvPr id="3" name="Notes Placeholder 2"/>
+          <p:cNvSpPr>
+            <a:spLocks noGrp="1"/>
+          </p:cNvSpPr>
+          <p:nvPr>
+            <p:ph type="body" idx="1"/>
+          </p:nvPr>
+        </p:nvSpPr>
+        <p:spPr/>
+        <p:txBody>
+          <a:bodyPr>
+            <a:normAutofit/>
+          </a:bodyPr>
+          <a:lstStyle/>
+          <a:p>
+            <a:r>
+              <a:rPr lang="nl-NL" dirty="0" smtClean="0"/>
+              <a:t>TODO: Find picture of posterior</a:t>
+            </a:r>
+            <a:r>
+              <a:rPr lang="nl-NL" baseline="0" dirty="0" smtClean="0"/>
+              <a:t> Toy example 4</a:t>
+            </a:r>
+          </a:p>
+          <a:p>
+            <a:endParaRPr lang="en-GB" dirty="0"/>
+          </a:p>
+        </p:txBody>
+      </p:sp>
+      <p:sp>
+        <p:nvSpPr>
+          <p:cNvPr id="4" name="Slide Number Placeholder 3"/>
+          <p:cNvSpPr>
+            <a:spLocks noGrp="1"/>
+          </p:cNvSpPr>
+          <p:nvPr>
+            <p:ph type="sldNum" sz="quarter" idx="10"/>
+          </p:nvPr>
+        </p:nvSpPr>
+        <p:spPr/>
+        <p:txBody>
+          <a:bodyPr/>
+          <a:lstStyle/>
+          <a:p>
+            <a:fld id="{9BBE7A90-5B18-44E6-896F-B56F6E25EE11}" type="slidenum">
+              <a:rPr lang="en-GB" smtClean="0"/>
+              <a:t>11</a:t>
+            </a:fld>
+            <a:endParaRPr lang="en-GB"/>
+          </a:p>
+        </p:txBody>
+      </p:sp>
+    </p:spTree>
+  </p:cSld>
+  <p:clrMapOvr>
+    <a:masterClrMapping/>
+  </p:clrMapOvr>
+</p:notes>
+</file>
+
+<file path=ppt/notesSlides/notesSlide6.xml><?xml version="1.0" encoding="utf-8"?>
+<p:notes xmlns:a="http://schemas.openxmlformats.org/drawingml/2006/main" xmlns:r="http://schemas.openxmlformats.org/officeDocument/2006/relationships" xmlns:p="http://schemas.openxmlformats.org/presentationml/2006/main">
+  <p:cSld>
+    <p:spTree>
+      <p:nvGrpSpPr>
+        <p:cNvPr id="1" name=""/>
+        <p:cNvGrpSpPr/>
+        <p:nvPr/>
+      </p:nvGrpSpPr>
+      <p:grpSpPr>
+        <a:xfrm>
+          <a:off x="0" y="0"/>
+          <a:ext cx="0" cy="0"/>
+          <a:chOff x="0" y="0"/>
+          <a:chExt cx="0" cy="0"/>
+        </a:xfrm>
+      </p:grpSpPr>
+      <p:sp>
+        <p:nvSpPr>
+          <p:cNvPr id="2" name="Slide Image Placeholder 1"/>
+          <p:cNvSpPr>
+            <a:spLocks noGrp="1" noRot="1" noChangeAspect="1"/>
+          </p:cNvSpPr>
+          <p:nvPr>
+            <p:ph type="sldImg"/>
+          </p:nvPr>
+        </p:nvSpPr>
+        <p:spPr/>
+      </p:sp>
+      <p:sp>
+        <p:nvSpPr>
+          <p:cNvPr id="3" name="Notes Placeholder 2"/>
+          <p:cNvSpPr>
+            <a:spLocks noGrp="1"/>
+          </p:cNvSpPr>
+          <p:nvPr>
+            <p:ph type="body" idx="1"/>
+          </p:nvPr>
+        </p:nvSpPr>
+        <p:spPr/>
+        <p:txBody>
+          <a:bodyPr>
+            <a:normAutofit/>
+          </a:bodyPr>
+          <a:lstStyle/>
+          <a:p>
+            <a:r>
+              <a:rPr lang="nl-NL" dirty="0" smtClean="0"/>
+              <a:t>TODO: Add legend</a:t>
+            </a:r>
+            <a:endParaRPr lang="en-GB" dirty="0"/>
+          </a:p>
+        </p:txBody>
+      </p:sp>
+      <p:sp>
+        <p:nvSpPr>
+          <p:cNvPr id="4" name="Slide Number Placeholder 3"/>
+          <p:cNvSpPr>
+            <a:spLocks noGrp="1"/>
+          </p:cNvSpPr>
+          <p:nvPr>
+            <p:ph type="sldNum" sz="quarter" idx="10"/>
+          </p:nvPr>
+        </p:nvSpPr>
+        <p:spPr/>
+        <p:txBody>
+          <a:bodyPr/>
+          <a:lstStyle/>
+          <a:p>
+            <a:fld id="{9BBE7A90-5B18-44E6-896F-B56F6E25EE11}" type="slidenum">
+              <a:rPr lang="en-GB" smtClean="0"/>
+              <a:t>12</a:t>
+            </a:fld>
+            <a:endParaRPr lang="en-GB"/>
+          </a:p>
+        </p:txBody>
+      </p:sp>
+    </p:spTree>
+  </p:cSld>
+  <p:clrMapOvr>
+    <a:masterClrMapping/>
+  </p:clrMapOvr>
+</p:notes>
+</file>
+
+<file path=ppt/notesSlides/notesSlide7.xml><?xml version="1.0" encoding="utf-8"?>
+<p:notes xmlns:a="http://schemas.openxmlformats.org/drawingml/2006/main" xmlns:r="http://schemas.openxmlformats.org/officeDocument/2006/relationships" xmlns:p="http://schemas.openxmlformats.org/presentationml/2006/main">
+  <p:cSld>
+    <p:spTree>
+      <p:nvGrpSpPr>
+        <p:cNvPr id="1" name=""/>
+        <p:cNvGrpSpPr/>
+        <p:nvPr/>
+      </p:nvGrpSpPr>
+      <p:grpSpPr>
+        <a:xfrm>
+          <a:off x="0" y="0"/>
+          <a:ext cx="0" cy="0"/>
+          <a:chOff x="0" y="0"/>
+          <a:chExt cx="0" cy="0"/>
+        </a:xfrm>
+      </p:grpSpPr>
+      <p:sp>
+        <p:nvSpPr>
+          <p:cNvPr id="2" name="Slide Image Placeholder 1"/>
+          <p:cNvSpPr>
+            <a:spLocks noGrp="1" noRot="1" noChangeAspect="1"/>
+          </p:cNvSpPr>
+          <p:nvPr>
+            <p:ph type="sldImg"/>
+          </p:nvPr>
+        </p:nvSpPr>
+        <p:spPr/>
+      </p:sp>
+      <p:sp>
+        <p:nvSpPr>
+          <p:cNvPr id="3" name="Notes Placeholder 2"/>
+          <p:cNvSpPr>
+            <a:spLocks noGrp="1"/>
+          </p:cNvSpPr>
+          <p:nvPr>
+            <p:ph type="body" idx="1"/>
+          </p:nvPr>
+        </p:nvSpPr>
+        <p:spPr/>
+        <p:txBody>
+          <a:bodyPr>
+            <a:normAutofit/>
+          </a:bodyPr>
+          <a:lstStyle/>
+          <a:p>
+            <a:r>
+              <a:rPr lang="nl-NL" dirty="0" smtClean="0"/>
+              <a:t>POSSIBLE QUESTIONS?:</a:t>
+            </a:r>
+          </a:p>
+          <a:p>
+            <a:r>
+              <a:rPr lang="nl-NL" dirty="0" smtClean="0"/>
+              <a:t>Q1:</a:t>
+            </a:r>
+            <a:r>
+              <a:rPr lang="nl-NL" baseline="0" dirty="0" smtClean="0"/>
+              <a:t> </a:t>
+            </a:r>
+            <a:endParaRPr lang="en-GB" dirty="0"/>
+          </a:p>
+        </p:txBody>
+      </p:sp>
+      <p:sp>
+        <p:nvSpPr>
+          <p:cNvPr id="4" name="Slide Number Placeholder 3"/>
+          <p:cNvSpPr>
+            <a:spLocks noGrp="1"/>
+          </p:cNvSpPr>
+          <p:nvPr>
+            <p:ph type="sldNum" sz="quarter" idx="10"/>
+          </p:nvPr>
+        </p:nvSpPr>
+        <p:spPr/>
+        <p:txBody>
+          <a:bodyPr/>
+          <a:lstStyle/>
+          <a:p>
+            <a:fld id="{9BBE7A90-5B18-44E6-896F-B56F6E25EE11}" type="slidenum">
+              <a:rPr lang="en-GB" smtClean="0"/>
+              <a:t>16</a:t>
+            </a:fld>
+            <a:endParaRPr lang="en-GB"/>
+          </a:p>
+        </p:txBody>
+      </p:sp>
+    </p:spTree>
+  </p:cSld>
+  <p:clrMapOvr>
+    <a:masterClrMapping/>
+  </p:clrMapOvr>
+</p:notes>
 </file>
 
 <file path=ppt/slideLayouts/slideLayout1.xml><?xml version="1.0" encoding="utf-8"?>
@@ -3094,27 +4089,7 @@
           <a:p>
             <a:r>
               <a:rPr lang="en-GB" sz="5400" dirty="0" smtClean="0"/>
-              <a:t>BEAST2 </a:t>
-            </a:r>
-            <a:r>
-              <a:rPr lang="en-GB" sz="5400" dirty="0" smtClean="0"/>
-              <a:t>and </a:t>
-            </a:r>
-            <a:r>
-              <a:rPr lang="en-GB" sz="5400" dirty="0" smtClean="0"/>
-              <a:t>Protracted </a:t>
-            </a:r>
-            <a:r>
-              <a:rPr lang="en-GB" sz="5400" dirty="0" smtClean="0"/>
-              <a:t>B</a:t>
-            </a:r>
-            <a:r>
-              <a:rPr lang="en-GB" sz="5400" dirty="0" smtClean="0"/>
-              <a:t>irth-Death </a:t>
-            </a:r>
-            <a:r>
-              <a:rPr lang="en-GB" sz="5400" dirty="0" smtClean="0"/>
-              <a:t>model</a:t>
+              <a:t>BEAST2 and Protracted Birth-Death model</a:t>
             </a:r>
             <a:endParaRPr lang="en-GB" sz="5400" dirty="0"/>
           </a:p>
@@ -3235,36 +4210,108 @@
         </p:nvSpPr>
         <p:spPr/>
         <p:txBody>
-          <a:bodyPr/>
-          <a:lstStyle/>
-          <a:p>
-            <a:r>
-              <a:rPr lang="en-GB" dirty="0" smtClean="0"/>
-              <a:t>Discussion</a:t>
+          <a:bodyPr>
+            <a:normAutofit/>
+          </a:bodyPr>
+          <a:lstStyle/>
+          <a:p>
+            <a:pPr lvl="1" algn="ctr" rtl="0">
+              <a:spcBef>
+                <a:spcPct val="0"/>
+              </a:spcBef>
+            </a:pPr>
+            <a:r>
+              <a:rPr lang="nl-NL" sz="2800" dirty="0" smtClean="0"/>
+              <a:t>3. </a:t>
+            </a:r>
+            <a:r>
+              <a:rPr lang="en-GB" sz="2800" dirty="0" smtClean="0"/>
+              <a:t>Convert to DNA alignment</a:t>
+            </a:r>
+            <a:endParaRPr lang="en-GB" sz="2800" dirty="0"/>
+          </a:p>
+        </p:txBody>
+      </p:sp>
+      <p:sp>
+        <p:nvSpPr>
+          <p:cNvPr id="3" name="Content Placeholder 2"/>
+          <p:cNvSpPr>
+            <a:spLocks noGrp="1"/>
+          </p:cNvSpPr>
+          <p:nvPr>
+            <p:ph idx="1"/>
+          </p:nvPr>
+        </p:nvSpPr>
+        <p:spPr>
+          <a:xfrm>
+            <a:off x="457200" y="1600200"/>
+            <a:ext cx="4191000" cy="4525963"/>
+          </a:xfrm>
+        </p:spPr>
+        <p:txBody>
+          <a:bodyPr/>
+          <a:lstStyle/>
+          <a:p>
+            <a:r>
+              <a:rPr lang="nl-NL" dirty="0" smtClean="0"/>
+              <a:t>Input BEAST2</a:t>
             </a:r>
             <a:endParaRPr lang="en-GB" dirty="0"/>
           </a:p>
         </p:txBody>
       </p:sp>
-      <p:sp>
-        <p:nvSpPr>
-          <p:cNvPr id="3" name="Content Placeholder 2"/>
-          <p:cNvSpPr>
-            <a:spLocks noGrp="1"/>
-          </p:cNvSpPr>
-          <p:nvPr>
-            <p:ph idx="1"/>
-          </p:nvPr>
-        </p:nvSpPr>
-        <p:spPr/>
-        <p:txBody>
-          <a:bodyPr/>
-          <a:lstStyle/>
-          <a:p>
-            <a:endParaRPr lang="en-GB" dirty="0"/>
-          </a:p>
-        </p:txBody>
-      </p:sp>
+      <p:pic>
+        <p:nvPicPr>
+          <p:cNvPr id="5122" name="Picture 2" descr="C:\Users\Aline\Dropbox\RUG 2015-2016\1.9 Community eclogy research\4. Poster_presentation\Photo's\Toy example 4_Alignment 1 (1).png"/>
+          <p:cNvPicPr>
+            <a:picLocks noChangeAspect="1" noChangeArrowheads="1"/>
+          </p:cNvPicPr>
+          <p:nvPr/>
+        </p:nvPicPr>
+        <p:blipFill>
+          <a:blip r:embed="rId3" cstate="print"/>
+          <a:srcRect/>
+          <a:stretch>
+            <a:fillRect/>
+          </a:stretch>
+        </p:blipFill>
+        <p:spPr bwMode="auto">
+          <a:xfrm>
+            <a:off x="5486400" y="1295400"/>
+            <a:ext cx="2743200" cy="2743200"/>
+          </a:xfrm>
+          <a:prstGeom prst="rect">
+            <a:avLst/>
+          </a:prstGeom>
+          <a:noFill/>
+        </p:spPr>
+      </p:pic>
+      <p:pic>
+        <p:nvPicPr>
+          <p:cNvPr id="5123" name="Picture 3" descr="C:\Users\Aline\Dropbox\RUG 2015-2016\1.9 Community eclogy research\4. Poster_presentation\Photo's\Toy example 4_Alignment 1 (2).png"/>
+          <p:cNvPicPr>
+            <a:picLocks noChangeAspect="1" noChangeArrowheads="1"/>
+          </p:cNvPicPr>
+          <p:nvPr/>
+        </p:nvPicPr>
+        <p:blipFill>
+          <a:blip r:embed="rId4" cstate="print"/>
+          <a:srcRect/>
+          <a:stretch>
+            <a:fillRect/>
+          </a:stretch>
+        </p:blipFill>
+        <p:spPr bwMode="auto">
+          <a:xfrm>
+            <a:off x="5562600" y="3810000"/>
+            <a:ext cx="2743200" cy="2743200"/>
+          </a:xfrm>
+          <a:prstGeom prst="rect">
+            <a:avLst/>
+          </a:prstGeom>
+          <a:noFill/>
+        </p:spPr>
+      </p:pic>
     </p:spTree>
   </p:cSld>
   <p:clrMapOvr>
@@ -3302,33 +4349,53 @@
         </p:nvSpPr>
         <p:spPr/>
         <p:txBody>
+          <a:bodyPr>
+            <a:normAutofit/>
+          </a:bodyPr>
+          <a:lstStyle/>
+          <a:p>
+            <a:pPr lvl="1" algn="ctr" rtl="0">
+              <a:spcBef>
+                <a:spcPct val="0"/>
+              </a:spcBef>
+            </a:pPr>
+            <a:r>
+              <a:rPr lang="nl-NL" sz="2800" dirty="0" smtClean="0"/>
+              <a:t>4. </a:t>
+            </a:r>
+            <a:r>
+              <a:rPr lang="en-GB" sz="2800" dirty="0" smtClean="0"/>
+              <a:t>Infer a posterior (BEAST2)</a:t>
+            </a:r>
+            <a:endParaRPr lang="en-GB" sz="2800" dirty="0"/>
+          </a:p>
+        </p:txBody>
+      </p:sp>
+      <p:sp>
+        <p:nvSpPr>
+          <p:cNvPr id="3" name="Content Placeholder 2"/>
+          <p:cNvSpPr>
+            <a:spLocks noGrp="1"/>
+          </p:cNvSpPr>
+          <p:nvPr>
+            <p:ph idx="1"/>
+          </p:nvPr>
+        </p:nvSpPr>
+        <p:spPr>
+          <a:xfrm>
+            <a:off x="457200" y="1600200"/>
+            <a:ext cx="4114800" cy="4525963"/>
+          </a:xfrm>
+        </p:spPr>
+        <p:txBody>
           <a:bodyPr/>
           <a:lstStyle/>
           <a:p>
             <a:r>
               <a:rPr lang="nl-NL" dirty="0" smtClean="0"/>
-              <a:t>Conclusion(s)</a:t>
+              <a:t>Output BEAST2</a:t>
             </a:r>
             <a:endParaRPr lang="en-GB" dirty="0"/>
-          </a:p>
-        </p:txBody>
-      </p:sp>
-      <p:sp>
-        <p:nvSpPr>
-          <p:cNvPr id="3" name="Content Placeholder 2"/>
-          <p:cNvSpPr>
-            <a:spLocks noGrp="1"/>
-          </p:cNvSpPr>
-          <p:nvPr>
-            <p:ph idx="1"/>
-          </p:nvPr>
-        </p:nvSpPr>
-        <p:spPr/>
-        <p:txBody>
-          <a:bodyPr/>
-          <a:lstStyle/>
-          <a:p>
-            <a:endParaRPr lang="en-GB"/>
           </a:p>
         </p:txBody>
       </p:sp>
@@ -3369,6 +4436,316 @@
         </p:nvSpPr>
         <p:spPr/>
         <p:txBody>
+          <a:bodyPr>
+            <a:normAutofit/>
+          </a:bodyPr>
+          <a:lstStyle/>
+          <a:p>
+            <a:pPr lvl="1" algn="ctr" rtl="0">
+              <a:spcBef>
+                <a:spcPct val="0"/>
+              </a:spcBef>
+            </a:pPr>
+            <a:r>
+              <a:rPr lang="nl-NL" sz="2800" dirty="0" smtClean="0"/>
+              <a:t>5. </a:t>
+            </a:r>
+            <a:r>
+              <a:rPr lang="nl-NL" sz="2800" dirty="0" smtClean="0"/>
+              <a:t>Compare posterior with true species tree (step1)</a:t>
+            </a:r>
+            <a:endParaRPr lang="en-GB" sz="2800" dirty="0"/>
+          </a:p>
+        </p:txBody>
+      </p:sp>
+      <p:sp>
+        <p:nvSpPr>
+          <p:cNvPr id="3" name="Content Placeholder 2"/>
+          <p:cNvSpPr>
+            <a:spLocks noGrp="1"/>
+          </p:cNvSpPr>
+          <p:nvPr>
+            <p:ph idx="1"/>
+          </p:nvPr>
+        </p:nvSpPr>
+        <p:spPr>
+          <a:xfrm>
+            <a:off x="457200" y="1600200"/>
+            <a:ext cx="4495800" cy="4525963"/>
+          </a:xfrm>
+        </p:spPr>
+        <p:txBody>
+          <a:bodyPr/>
+          <a:lstStyle/>
+          <a:p>
+            <a:endParaRPr lang="en-GB" dirty="0"/>
+          </a:p>
+        </p:txBody>
+      </p:sp>
+      <p:pic>
+        <p:nvPicPr>
+          <p:cNvPr id="3074" name="Picture 2" descr="C:\Users\Aline\Dropbox\RUG 2015-2016\1.9 Community eclogy research\4. Poster_presentation\Photo's\Toy example 4_nLTT plot posterior and true tree.png"/>
+          <p:cNvPicPr>
+            <a:picLocks noChangeAspect="1" noChangeArrowheads="1"/>
+          </p:cNvPicPr>
+          <p:nvPr/>
+        </p:nvPicPr>
+        <p:blipFill>
+          <a:blip r:embed="rId3" cstate="print"/>
+          <a:srcRect/>
+          <a:stretch>
+            <a:fillRect/>
+          </a:stretch>
+        </p:blipFill>
+        <p:spPr bwMode="auto">
+          <a:xfrm>
+            <a:off x="5105400" y="1981200"/>
+            <a:ext cx="3733800" cy="3733800"/>
+          </a:xfrm>
+          <a:prstGeom prst="rect">
+            <a:avLst/>
+          </a:prstGeom>
+          <a:noFill/>
+        </p:spPr>
+      </p:pic>
+    </p:spTree>
+  </p:cSld>
+  <p:clrMapOvr>
+    <a:masterClrMapping/>
+  </p:clrMapOvr>
+</p:sld>
+</file>
+
+<file path=ppt/slides/slide13.xml><?xml version="1.0" encoding="utf-8"?>
+<p:sld xmlns:a="http://schemas.openxmlformats.org/drawingml/2006/main" xmlns:r="http://schemas.openxmlformats.org/officeDocument/2006/relationships" xmlns:p="http://schemas.openxmlformats.org/presentationml/2006/main">
+  <p:cSld>
+    <p:spTree>
+      <p:nvGrpSpPr>
+        <p:cNvPr id="1" name=""/>
+        <p:cNvGrpSpPr/>
+        <p:nvPr/>
+      </p:nvGrpSpPr>
+      <p:grpSpPr>
+        <a:xfrm>
+          <a:off x="0" y="0"/>
+          <a:ext cx="0" cy="0"/>
+          <a:chOff x="0" y="0"/>
+          <a:chExt cx="0" cy="0"/>
+        </a:xfrm>
+      </p:grpSpPr>
+      <p:sp>
+        <p:nvSpPr>
+          <p:cNvPr id="2" name="Title 1"/>
+          <p:cNvSpPr>
+            <a:spLocks noGrp="1"/>
+          </p:cNvSpPr>
+          <p:nvPr>
+            <p:ph type="title"/>
+          </p:nvPr>
+        </p:nvSpPr>
+        <p:spPr/>
+        <p:txBody>
+          <a:bodyPr/>
+          <a:lstStyle/>
+          <a:p>
+            <a:r>
+              <a:rPr lang="en-GB" dirty="0" smtClean="0"/>
+              <a:t>Results</a:t>
+            </a:r>
+            <a:endParaRPr lang="en-GB" dirty="0"/>
+          </a:p>
+        </p:txBody>
+      </p:sp>
+      <p:sp>
+        <p:nvSpPr>
+          <p:cNvPr id="3" name="Content Placeholder 2"/>
+          <p:cNvSpPr>
+            <a:spLocks noGrp="1"/>
+          </p:cNvSpPr>
+          <p:nvPr>
+            <p:ph idx="1"/>
+          </p:nvPr>
+        </p:nvSpPr>
+        <p:spPr/>
+        <p:txBody>
+          <a:bodyPr/>
+          <a:lstStyle/>
+          <a:p>
+            <a:endParaRPr lang="en-GB" dirty="0"/>
+          </a:p>
+        </p:txBody>
+      </p:sp>
+    </p:spTree>
+  </p:cSld>
+  <p:clrMapOvr>
+    <a:masterClrMapping/>
+  </p:clrMapOvr>
+</p:sld>
+</file>
+
+<file path=ppt/slides/slide14.xml><?xml version="1.0" encoding="utf-8"?>
+<p:sld xmlns:a="http://schemas.openxmlformats.org/drawingml/2006/main" xmlns:r="http://schemas.openxmlformats.org/officeDocument/2006/relationships" xmlns:p="http://schemas.openxmlformats.org/presentationml/2006/main">
+  <p:cSld>
+    <p:spTree>
+      <p:nvGrpSpPr>
+        <p:cNvPr id="1" name=""/>
+        <p:cNvGrpSpPr/>
+        <p:nvPr/>
+      </p:nvGrpSpPr>
+      <p:grpSpPr>
+        <a:xfrm>
+          <a:off x="0" y="0"/>
+          <a:ext cx="0" cy="0"/>
+          <a:chOff x="0" y="0"/>
+          <a:chExt cx="0" cy="0"/>
+        </a:xfrm>
+      </p:grpSpPr>
+      <p:sp>
+        <p:nvSpPr>
+          <p:cNvPr id="2" name="Title 1"/>
+          <p:cNvSpPr>
+            <a:spLocks noGrp="1"/>
+          </p:cNvSpPr>
+          <p:nvPr>
+            <p:ph type="title"/>
+          </p:nvPr>
+        </p:nvSpPr>
+        <p:spPr/>
+        <p:txBody>
+          <a:bodyPr/>
+          <a:lstStyle/>
+          <a:p>
+            <a:r>
+              <a:rPr lang="en-GB" dirty="0" smtClean="0"/>
+              <a:t>Discussion</a:t>
+            </a:r>
+            <a:endParaRPr lang="en-GB" dirty="0"/>
+          </a:p>
+        </p:txBody>
+      </p:sp>
+      <p:sp>
+        <p:nvSpPr>
+          <p:cNvPr id="3" name="Content Placeholder 2"/>
+          <p:cNvSpPr>
+            <a:spLocks noGrp="1"/>
+          </p:cNvSpPr>
+          <p:nvPr>
+            <p:ph idx="1"/>
+          </p:nvPr>
+        </p:nvSpPr>
+        <p:spPr/>
+        <p:txBody>
+          <a:bodyPr/>
+          <a:lstStyle/>
+          <a:p>
+            <a:endParaRPr lang="en-GB" dirty="0"/>
+          </a:p>
+        </p:txBody>
+      </p:sp>
+    </p:spTree>
+  </p:cSld>
+  <p:clrMapOvr>
+    <a:masterClrMapping/>
+  </p:clrMapOvr>
+</p:sld>
+</file>
+
+<file path=ppt/slides/slide15.xml><?xml version="1.0" encoding="utf-8"?>
+<p:sld xmlns:a="http://schemas.openxmlformats.org/drawingml/2006/main" xmlns:r="http://schemas.openxmlformats.org/officeDocument/2006/relationships" xmlns:p="http://schemas.openxmlformats.org/presentationml/2006/main">
+  <p:cSld>
+    <p:spTree>
+      <p:nvGrpSpPr>
+        <p:cNvPr id="1" name=""/>
+        <p:cNvGrpSpPr/>
+        <p:nvPr/>
+      </p:nvGrpSpPr>
+      <p:grpSpPr>
+        <a:xfrm>
+          <a:off x="0" y="0"/>
+          <a:ext cx="0" cy="0"/>
+          <a:chOff x="0" y="0"/>
+          <a:chExt cx="0" cy="0"/>
+        </a:xfrm>
+      </p:grpSpPr>
+      <p:sp>
+        <p:nvSpPr>
+          <p:cNvPr id="2" name="Title 1"/>
+          <p:cNvSpPr>
+            <a:spLocks noGrp="1"/>
+          </p:cNvSpPr>
+          <p:nvPr>
+            <p:ph type="title"/>
+          </p:nvPr>
+        </p:nvSpPr>
+        <p:spPr/>
+        <p:txBody>
+          <a:bodyPr/>
+          <a:lstStyle/>
+          <a:p>
+            <a:r>
+              <a:rPr lang="nl-NL" dirty="0" smtClean="0"/>
+              <a:t>Conclusion(s)</a:t>
+            </a:r>
+            <a:endParaRPr lang="en-GB" dirty="0"/>
+          </a:p>
+        </p:txBody>
+      </p:sp>
+      <p:sp>
+        <p:nvSpPr>
+          <p:cNvPr id="3" name="Content Placeholder 2"/>
+          <p:cNvSpPr>
+            <a:spLocks noGrp="1"/>
+          </p:cNvSpPr>
+          <p:nvPr>
+            <p:ph idx="1"/>
+          </p:nvPr>
+        </p:nvSpPr>
+        <p:spPr/>
+        <p:txBody>
+          <a:bodyPr/>
+          <a:lstStyle/>
+          <a:p>
+            <a:endParaRPr lang="en-GB"/>
+          </a:p>
+        </p:txBody>
+      </p:sp>
+    </p:spTree>
+  </p:cSld>
+  <p:clrMapOvr>
+    <a:masterClrMapping/>
+  </p:clrMapOvr>
+</p:sld>
+</file>
+
+<file path=ppt/slides/slide16.xml><?xml version="1.0" encoding="utf-8"?>
+<p:sld xmlns:a="http://schemas.openxmlformats.org/drawingml/2006/main" xmlns:r="http://schemas.openxmlformats.org/officeDocument/2006/relationships" xmlns:p="http://schemas.openxmlformats.org/presentationml/2006/main">
+  <p:cSld>
+    <p:spTree>
+      <p:nvGrpSpPr>
+        <p:cNvPr id="1" name=""/>
+        <p:cNvGrpSpPr/>
+        <p:nvPr/>
+      </p:nvGrpSpPr>
+      <p:grpSpPr>
+        <a:xfrm>
+          <a:off x="0" y="0"/>
+          <a:ext cx="0" cy="0"/>
+          <a:chOff x="0" y="0"/>
+          <a:chExt cx="0" cy="0"/>
+        </a:xfrm>
+      </p:grpSpPr>
+      <p:sp>
+        <p:nvSpPr>
+          <p:cNvPr id="2" name="Title 1"/>
+          <p:cNvSpPr>
+            <a:spLocks noGrp="1"/>
+          </p:cNvSpPr>
+          <p:nvPr>
+            <p:ph type="title"/>
+          </p:nvPr>
+        </p:nvSpPr>
+        <p:spPr/>
+        <p:txBody>
           <a:bodyPr/>
           <a:lstStyle/>
           <a:p>
@@ -3459,20 +4836,55 @@
         </p:nvSpPr>
         <p:spPr/>
         <p:txBody>
-          <a:bodyPr/>
+          <a:bodyPr>
+            <a:normAutofit/>
+          </a:bodyPr>
           <a:lstStyle/>
           <a:p>
             <a:r>
               <a:rPr lang="en-GB" dirty="0" smtClean="0"/>
-              <a:t>Standard Birth-Death model (BD)</a:t>
+              <a:t>Standard Birth-Death model (BD</a:t>
+            </a:r>
+            <a:r>
+              <a:rPr lang="en-GB" dirty="0" smtClean="0"/>
+              <a:t>)</a:t>
+            </a:r>
+          </a:p>
+          <a:p>
+            <a:pPr lvl="1"/>
+            <a:r>
+              <a:rPr lang="nl-NL" dirty="0" smtClean="0"/>
+              <a:t>Constant speciation and extinction rates</a:t>
+            </a:r>
+          </a:p>
+          <a:p>
+            <a:pPr lvl="1"/>
+            <a:r>
+              <a:rPr lang="nl-NL" dirty="0" smtClean="0"/>
+              <a:t>Number of lineages increase constant or accelerated (pull of the present)</a:t>
+            </a:r>
+          </a:p>
+          <a:p>
+            <a:pPr lvl="1"/>
+            <a:endParaRPr lang="nl-NL" dirty="0" smtClean="0"/>
+          </a:p>
+          <a:p>
+            <a:pPr>
+              <a:buNone/>
+            </a:pPr>
+            <a:r>
+              <a:rPr lang="nl-NL" dirty="0" smtClean="0"/>
+              <a:t>BUT: </a:t>
+            </a:r>
+            <a:r>
+              <a:rPr lang="nl-NL" b="1" dirty="0" smtClean="0"/>
+              <a:t>slowdown</a:t>
+            </a:r>
+            <a:r>
+              <a:rPr lang="nl-NL" dirty="0" smtClean="0"/>
+              <a:t> observed towards the present</a:t>
             </a:r>
             <a:endParaRPr lang="en-GB" dirty="0" smtClean="0"/>
-          </a:p>
-          <a:p>
-            <a:pPr>
-              <a:buNone/>
-            </a:pPr>
-            <a:endParaRPr lang="nl-NL" dirty="0" smtClean="0"/>
           </a:p>
           <a:p>
             <a:pPr>
@@ -3550,22 +4962,43 @@
             <p:ph idx="1"/>
           </p:nvPr>
         </p:nvSpPr>
-        <p:spPr/>
-        <p:txBody>
-          <a:bodyPr/>
-          <a:lstStyle/>
-          <a:p>
+        <p:spPr>
+          <a:xfrm>
+            <a:off x="457200" y="1600200"/>
+            <a:ext cx="8229600" cy="3886199"/>
+          </a:xfrm>
+        </p:spPr>
+        <p:txBody>
+          <a:bodyPr/>
+          <a:lstStyle/>
+          <a:p>
+            <a:r>
+              <a:rPr lang="nl-NL" b="1" dirty="0" smtClean="0"/>
+              <a:t>Protracted</a:t>
+            </a:r>
             <a:r>
               <a:rPr lang="nl-NL" dirty="0" smtClean="0"/>
-              <a:t>Protracted Birth-Death model (PBD)</a:t>
+              <a:t> Birth-Death model (PBD)</a:t>
             </a:r>
           </a:p>
           <a:p>
             <a:pPr lvl="1"/>
             <a:r>
               <a:rPr lang="nl-NL" dirty="0" smtClean="0"/>
-              <a:t>Extension of BD</a:t>
-            </a:r>
+              <a:t>Extension of </a:t>
+            </a:r>
+            <a:r>
+              <a:rPr lang="nl-NL" dirty="0" smtClean="0"/>
+              <a:t>BD</a:t>
+            </a:r>
+          </a:p>
+          <a:p>
+            <a:pPr lvl="1"/>
+            <a:r>
+              <a:rPr lang="nl-NL" dirty="0" smtClean="0"/>
+              <a:t>Assumes speciation takes time</a:t>
+            </a:r>
+            <a:endParaRPr lang="nl-NL" dirty="0" smtClean="0"/>
           </a:p>
           <a:p>
             <a:pPr lvl="1"/>
@@ -3579,20 +5012,36 @@
             <a:pPr>
               <a:buNone/>
             </a:pPr>
-            <a:r>
-              <a:rPr lang="nl-NL" dirty="0" smtClean="0"/>
-              <a:t>		[picture]</a:t>
-            </a:r>
-            <a:endParaRPr lang="en-GB" dirty="0" smtClean="0"/>
-          </a:p>
-          <a:p>
-            <a:pPr>
-              <a:buNone/>
-            </a:pPr>
             <a:endParaRPr lang="nl-NL" dirty="0" smtClean="0"/>
           </a:p>
         </p:txBody>
       </p:sp>
+      <p:pic>
+        <p:nvPicPr>
+          <p:cNvPr id="2051" name="Picture 3" descr="C:\Users\Aline\Cer2016\doc\EtienneEtAl2014Fig1a.png"/>
+          <p:cNvPicPr>
+            <a:picLocks noChangeAspect="1" noChangeArrowheads="1"/>
+          </p:cNvPicPr>
+          <p:nvPr/>
+        </p:nvPicPr>
+        <p:blipFill>
+          <a:blip r:embed="rId2" cstate="print"/>
+          <a:srcRect/>
+          <a:stretch>
+            <a:fillRect/>
+          </a:stretch>
+        </p:blipFill>
+        <p:spPr bwMode="auto">
+          <a:xfrm>
+            <a:off x="5257800" y="3276600"/>
+            <a:ext cx="3448050" cy="3327969"/>
+          </a:xfrm>
+          <a:prstGeom prst="rect">
+            <a:avLst/>
+          </a:prstGeom>
+          <a:noFill/>
+        </p:spPr>
+      </p:pic>
     </p:spTree>
   </p:cSld>
   <p:clrMapOvr>
@@ -3662,22 +5111,14 @@
             </a:pPr>
             <a:r>
               <a:rPr lang="en-GB" dirty="0" smtClean="0"/>
-              <a:t>Bayesian Evolutionary Analysis by Sampling </a:t>
-            </a:r>
+              <a:t>Bayesian Evolutionary Analysis by Sampling Trees (BEAST)</a:t>
+            </a:r>
+          </a:p>
+          <a:p>
+            <a:pPr lvl="1"/>
             <a:r>
               <a:rPr lang="en-GB" dirty="0" smtClean="0"/>
-              <a:t>Trees (BEAST)</a:t>
-            </a:r>
-          </a:p>
-          <a:p>
-            <a:pPr lvl="1"/>
-            <a:r>
-              <a:rPr lang="en-GB" dirty="0" smtClean="0"/>
-              <a:t>Bayesian </a:t>
-            </a:r>
-            <a:r>
-              <a:rPr lang="en-GB" dirty="0" smtClean="0"/>
-              <a:t>statistics</a:t>
+              <a:t>Bayesian statistics</a:t>
             </a:r>
           </a:p>
           <a:p>
@@ -3768,19 +5209,7 @@
             </a:pPr>
             <a:r>
               <a:rPr lang="nl-NL" dirty="0" smtClean="0"/>
-              <a:t>“Is it necessary to include </a:t>
-            </a:r>
-            <a:r>
-              <a:rPr lang="nl-NL" dirty="0" smtClean="0"/>
-              <a:t>PBD in </a:t>
-            </a:r>
-            <a:r>
-              <a:rPr lang="nl-NL" dirty="0" smtClean="0"/>
-              <a:t>Beast2</a:t>
-            </a:r>
-            <a:r>
-              <a:rPr lang="nl-NL" dirty="0" smtClean="0"/>
-              <a:t>?”</a:t>
+              <a:t>“Is it necessary to include PBD in Beast2?”</a:t>
             </a:r>
           </a:p>
           <a:p>
@@ -3789,11 +5218,7 @@
             </a:pPr>
             <a:r>
               <a:rPr lang="nl-NL" sz="2400" dirty="0" smtClean="0"/>
-              <a:t>Error </a:t>
-            </a:r>
-            <a:r>
-              <a:rPr lang="nl-NL" sz="2400" dirty="0" smtClean="0"/>
-              <a:t>BD vs PBD trees?</a:t>
+              <a:t>Error BD vs PBD trees?</a:t>
             </a:r>
           </a:p>
           <a:p>
@@ -3886,14 +5311,23 @@
             <a:pPr lvl="1"/>
             <a:r>
               <a:rPr lang="nl-NL" dirty="0" smtClean="0"/>
-              <a:t>Beast2</a:t>
-            </a:r>
+              <a:t>BEAST2</a:t>
+            </a:r>
+            <a:endParaRPr lang="nl-NL" dirty="0" smtClean="0"/>
           </a:p>
           <a:p>
             <a:pPr lvl="1"/>
             <a:r>
               <a:rPr lang="nl-NL" dirty="0" smtClean="0"/>
-              <a:t>Simulated BD and PBD data</a:t>
+              <a:t>Simulated </a:t>
+            </a:r>
+            <a:r>
+              <a:rPr lang="nl-NL" dirty="0" smtClean="0"/>
+              <a:t>PBD </a:t>
+            </a:r>
+            <a:r>
+              <a:rPr lang="nl-NL" dirty="0" smtClean="0"/>
+              <a:t>data</a:t>
             </a:r>
           </a:p>
           <a:p>
@@ -3984,9 +5418,18 @@
               <a:buAutoNum type="arabicPeriod"/>
             </a:pPr>
             <a:r>
-              <a:rPr lang="nl-NL" dirty="0" smtClean="0"/>
-              <a:t>Bla</a:t>
-            </a:r>
+              <a:rPr lang="en-GB" dirty="0" smtClean="0"/>
+              <a:t>Create </a:t>
+            </a:r>
+            <a:r>
+              <a:rPr lang="en-GB" dirty="0" smtClean="0"/>
+              <a:t>incipient species </a:t>
+            </a:r>
+            <a:r>
+              <a:rPr lang="en-GB" dirty="0" smtClean="0"/>
+              <a:t>trees (simulated)</a:t>
+            </a:r>
+            <a:endParaRPr lang="nl-NL" dirty="0" smtClean="0"/>
           </a:p>
           <a:p>
             <a:pPr marL="971550" lvl="1" indent="-514350">
@@ -3994,9 +5437,14 @@
               <a:buAutoNum type="arabicPeriod"/>
             </a:pPr>
             <a:r>
-              <a:rPr lang="nl-NL" dirty="0" smtClean="0"/>
-              <a:t>Bla</a:t>
-            </a:r>
+              <a:rPr lang="en-GB" dirty="0" smtClean="0"/>
+              <a:t>Sample a (monophyletic) species </a:t>
+            </a:r>
+            <a:r>
+              <a:rPr lang="en-GB" dirty="0" smtClean="0"/>
+              <a:t>trees</a:t>
+            </a:r>
+            <a:endParaRPr lang="nl-NL" dirty="0" smtClean="0"/>
           </a:p>
           <a:p>
             <a:pPr marL="971550" lvl="1" indent="-514350">
@@ -4004,9 +5452,14 @@
               <a:buAutoNum type="arabicPeriod"/>
             </a:pPr>
             <a:r>
-              <a:rPr lang="nl-NL" dirty="0" smtClean="0"/>
-              <a:t>Bla</a:t>
-            </a:r>
+              <a:rPr lang="en-GB" dirty="0" smtClean="0"/>
+              <a:t>Convert to </a:t>
+            </a:r>
+            <a:r>
+              <a:rPr lang="en-GB" dirty="0" smtClean="0"/>
+              <a:t>DNA alignment</a:t>
+            </a:r>
+            <a:endParaRPr lang="nl-NL" dirty="0" smtClean="0"/>
           </a:p>
           <a:p>
             <a:pPr marL="971550" lvl="1" indent="-514350">
@@ -4014,9 +5467,10 @@
               <a:buAutoNum type="arabicPeriod"/>
             </a:pPr>
             <a:r>
-              <a:rPr lang="nl-NL" dirty="0" smtClean="0"/>
-              <a:t>Bla</a:t>
-            </a:r>
+              <a:rPr lang="en-GB" dirty="0" smtClean="0"/>
+              <a:t>Infer a posterior (BEAST2)</a:t>
+            </a:r>
+            <a:endParaRPr lang="nl-NL" dirty="0" smtClean="0"/>
           </a:p>
           <a:p>
             <a:pPr marL="971550" lvl="1" indent="-514350">
@@ -4025,8 +5479,9 @@
             </a:pPr>
             <a:r>
               <a:rPr lang="nl-NL" dirty="0" smtClean="0"/>
-              <a:t>bla</a:t>
-            </a:r>
+              <a:t>Compare posterior with true species tree from step 1</a:t>
+            </a:r>
+            <a:endParaRPr lang="nl-NL" dirty="0" smtClean="0"/>
           </a:p>
         </p:txBody>
       </p:sp>
@@ -4067,10 +5522,25 @@
         </p:nvSpPr>
         <p:spPr/>
         <p:txBody>
-          <a:bodyPr/>
-          <a:lstStyle/>
-          <a:p>
-            <a:endParaRPr lang="en-GB"/>
+          <a:bodyPr>
+            <a:normAutofit/>
+          </a:bodyPr>
+          <a:lstStyle/>
+          <a:p>
+            <a:pPr lvl="1" algn="ctr" rtl="0">
+              <a:spcBef>
+                <a:spcPct val="0"/>
+              </a:spcBef>
+            </a:pPr>
+            <a:r>
+              <a:rPr lang="nl-NL" sz="2800" dirty="0" smtClean="0"/>
+              <a:t>1. </a:t>
+            </a:r>
+            <a:r>
+              <a:rPr lang="en-GB" sz="2800" dirty="0" smtClean="0"/>
+              <a:t>Create ‘true’ species trees (simulated)</a:t>
+            </a:r>
+            <a:endParaRPr lang="en-GB" sz="2800" dirty="0"/>
           </a:p>
         </p:txBody>
       </p:sp>
@@ -4084,15 +5554,72 @@
             <p:ph idx="1"/>
           </p:nvPr>
         </p:nvSpPr>
-        <p:spPr/>
-        <p:txBody>
-          <a:bodyPr/>
-          <a:lstStyle/>
-          <a:p>
-            <a:endParaRPr lang="en-GB"/>
-          </a:p>
-        </p:txBody>
-      </p:sp>
+        <p:spPr>
+          <a:xfrm>
+            <a:off x="457200" y="1600200"/>
+            <a:ext cx="3733800" cy="4525963"/>
+          </a:xfrm>
+        </p:spPr>
+        <p:txBody>
+          <a:bodyPr/>
+          <a:lstStyle/>
+          <a:p>
+            <a:endParaRPr lang="en-GB" dirty="0"/>
+          </a:p>
+        </p:txBody>
+      </p:sp>
+      <p:pic>
+        <p:nvPicPr>
+          <p:cNvPr id="1026" name="Picture 2" descr="C:\Users\Aline\Dropbox\RUG 2015-2016\1.9 Community eclogy research\4. Poster_presentation\Photo's\Toy example 4_Incipient species tree.png"/>
+          <p:cNvPicPr>
+            <a:picLocks noChangeAspect="1" noChangeArrowheads="1"/>
+          </p:cNvPicPr>
+          <p:nvPr/>
+        </p:nvPicPr>
+        <p:blipFill>
+          <a:blip r:embed="rId3" cstate="print"/>
+          <a:srcRect/>
+          <a:stretch>
+            <a:fillRect/>
+          </a:stretch>
+        </p:blipFill>
+        <p:spPr bwMode="auto">
+          <a:xfrm>
+            <a:off x="5410200" y="1143000"/>
+            <a:ext cx="2743200" cy="2743200"/>
+          </a:xfrm>
+          <a:prstGeom prst="rect">
+            <a:avLst/>
+          </a:prstGeom>
+          <a:noFill/>
+        </p:spPr>
+      </p:pic>
+      <p:pic>
+        <p:nvPicPr>
+          <p:cNvPr id="1027" name="Picture 3" descr="C:\Users\Aline\Dropbox\RUG 2015-2016\1.9 Community eclogy research\4. Poster_presentation\Photo's\Toy example 4_nLTT plot.png"/>
+          <p:cNvPicPr>
+            <a:picLocks noChangeAspect="1" noChangeArrowheads="1"/>
+          </p:cNvPicPr>
+          <p:nvPr/>
+        </p:nvPicPr>
+        <p:blipFill>
+          <a:blip r:embed="rId4" cstate="print"/>
+          <a:srcRect/>
+          <a:stretch>
+            <a:fillRect/>
+          </a:stretch>
+        </p:blipFill>
+        <p:spPr bwMode="auto">
+          <a:xfrm>
+            <a:off x="5410200" y="3886200"/>
+            <a:ext cx="2590800" cy="2590800"/>
+          </a:xfrm>
+          <a:prstGeom prst="rect">
+            <a:avLst/>
+          </a:prstGeom>
+          <a:noFill/>
+        </p:spPr>
+      </p:pic>
     </p:spTree>
   </p:cSld>
   <p:clrMapOvr>
@@ -4130,36 +5657,104 @@
         </p:nvSpPr>
         <p:spPr/>
         <p:txBody>
-          <a:bodyPr/>
-          <a:lstStyle/>
-          <a:p>
-            <a:r>
-              <a:rPr lang="en-GB" dirty="0" smtClean="0"/>
-              <a:t>Results</a:t>
-            </a:r>
+          <a:bodyPr>
+            <a:normAutofit/>
+          </a:bodyPr>
+          <a:lstStyle/>
+          <a:p>
+            <a:pPr lvl="1" algn="ctr" rtl="0">
+              <a:spcBef>
+                <a:spcPct val="0"/>
+              </a:spcBef>
+            </a:pPr>
+            <a:r>
+              <a:rPr lang="nl-NL" sz="2800" dirty="0" smtClean="0"/>
+              <a:t>2. </a:t>
+            </a:r>
+            <a:r>
+              <a:rPr lang="en-GB" sz="2800" dirty="0" smtClean="0"/>
+              <a:t>Sample a (monophyletic) species trees</a:t>
+            </a:r>
+            <a:endParaRPr lang="en-GB" sz="2800" dirty="0"/>
+          </a:p>
+        </p:txBody>
+      </p:sp>
+      <p:sp>
+        <p:nvSpPr>
+          <p:cNvPr id="3" name="Content Placeholder 2"/>
+          <p:cNvSpPr>
+            <a:spLocks noGrp="1"/>
+          </p:cNvSpPr>
+          <p:nvPr>
+            <p:ph idx="1"/>
+          </p:nvPr>
+        </p:nvSpPr>
+        <p:spPr>
+          <a:xfrm>
+            <a:off x="457200" y="1600200"/>
+            <a:ext cx="4191000" cy="4525963"/>
+          </a:xfrm>
+        </p:spPr>
+        <p:txBody>
+          <a:bodyPr/>
+          <a:lstStyle/>
+          <a:p>
             <a:endParaRPr lang="en-GB" dirty="0"/>
           </a:p>
         </p:txBody>
       </p:sp>
-      <p:sp>
-        <p:nvSpPr>
-          <p:cNvPr id="3" name="Content Placeholder 2"/>
-          <p:cNvSpPr>
-            <a:spLocks noGrp="1"/>
-          </p:cNvSpPr>
-          <p:nvPr>
-            <p:ph idx="1"/>
-          </p:nvPr>
-        </p:nvSpPr>
-        <p:spPr/>
-        <p:txBody>
-          <a:bodyPr/>
-          <a:lstStyle/>
-          <a:p>
-            <a:endParaRPr lang="en-GB" dirty="0"/>
-          </a:p>
-        </p:txBody>
-      </p:sp>
+      <p:pic>
+        <p:nvPicPr>
+          <p:cNvPr id="4098" name="Picture 2" descr="C:\Users\Aline\Dropbox\RUG 2015-2016\1.9 Community eclogy research\4. Poster_presentation\Photo's\Toy example 4_Sampled species tree 1.png"/>
+          <p:cNvPicPr>
+            <a:picLocks noChangeAspect="1" noChangeArrowheads="1"/>
+          </p:cNvPicPr>
+          <p:nvPr/>
+        </p:nvPicPr>
+        <p:blipFill>
+          <a:blip r:embed="rId3" cstate="print"/>
+          <a:srcRect/>
+          <a:stretch>
+            <a:fillRect/>
+          </a:stretch>
+        </p:blipFill>
+        <p:spPr bwMode="auto">
+          <a:xfrm>
+            <a:off x="5334000" y="1371600"/>
+            <a:ext cx="3048000" cy="3048000"/>
+          </a:xfrm>
+          <a:prstGeom prst="rect">
+            <a:avLst/>
+          </a:prstGeom>
+          <a:noFill/>
+        </p:spPr>
+      </p:pic>
+      <p:pic>
+        <p:nvPicPr>
+          <p:cNvPr id="4099" name="Picture 3" descr="C:\Users\Aline\Dropbox\RUG 2015-2016\1.9 Community eclogy research\4. Poster_presentation\Photo's\Toy example 4_Sampled species tree 2.png"/>
+          <p:cNvPicPr>
+            <a:picLocks noChangeAspect="1" noChangeArrowheads="1"/>
+          </p:cNvPicPr>
+          <p:nvPr/>
+        </p:nvPicPr>
+        <p:blipFill>
+          <a:blip r:embed="rId4" cstate="print"/>
+          <a:srcRect/>
+          <a:stretch>
+            <a:fillRect/>
+          </a:stretch>
+        </p:blipFill>
+        <p:spPr bwMode="auto">
+          <a:xfrm>
+            <a:off x="5486400" y="3810000"/>
+            <a:ext cx="2819400" cy="2819400"/>
+          </a:xfrm>
+          <a:prstGeom prst="rect">
+            <a:avLst/>
+          </a:prstGeom>
+          <a:noFill/>
+        </p:spPr>
+      </p:pic>
     </p:spTree>
   </p:cSld>
   <p:clrMapOvr>
@@ -4449,4 +6044,287 @@
   <a:objectDefaults/>
   <a:extraClrSchemeLst/>
 </a:theme>
+</file>
+
+<file path=ppt/theme/theme2.xml><?xml version="1.0" encoding="utf-8"?>
+<a:theme xmlns:a="http://schemas.openxmlformats.org/drawingml/2006/main" name="Office Theme">
+  <a:themeElements>
+    <a:clrScheme name="Office">
+      <a:dk1>
+        <a:sysClr val="windowText" lastClr="000000"/>
+      </a:dk1>
+      <a:lt1>
+        <a:sysClr val="window" lastClr="FFFFFF"/>
+      </a:lt1>
+      <a:dk2>
+        <a:srgbClr val="1F497D"/>
+      </a:dk2>
+      <a:lt2>
+        <a:srgbClr val="EEECE1"/>
+      </a:lt2>
+      <a:accent1>
+        <a:srgbClr val="4F81BD"/>
+      </a:accent1>
+      <a:accent2>
+        <a:srgbClr val="C0504D"/>
+      </a:accent2>
+      <a:accent3>
+        <a:srgbClr val="9BBB59"/>
+      </a:accent3>
+      <a:accent4>
+        <a:srgbClr val="8064A2"/>
+      </a:accent4>
+      <a:accent5>
+        <a:srgbClr val="4BACC6"/>
+      </a:accent5>
+      <a:accent6>
+        <a:srgbClr val="F79646"/>
+      </a:accent6>
+      <a:hlink>
+        <a:srgbClr val="0000FF"/>
+      </a:hlink>
+      <a:folHlink>
+        <a:srgbClr val="800080"/>
+      </a:folHlink>
+    </a:clrScheme>
+    <a:fontScheme name="Office">
+      <a:majorFont>
+        <a:latin typeface="Calibri"/>
+        <a:ea typeface=""/>
+        <a:cs typeface=""/>
+        <a:font script="Jpan" typeface="ＭＳ Ｐゴシック"/>
+        <a:font script="Hang" typeface="맑은 고딕"/>
+        <a:font script="Hans" typeface="宋体"/>
+        <a:font script="Hant" typeface="新細明體"/>
+        <a:font script="Arab" typeface="Times New Roman"/>
+        <a:font script="Hebr" typeface="Times New Roman"/>
+        <a:font script="Thai" typeface="Angsana New"/>
+        <a:font script="Ethi" typeface="Nyala"/>
+        <a:font script="Beng" typeface="Vrinda"/>
+        <a:font script="Gujr" typeface="Shruti"/>
+        <a:font script="Khmr" typeface="MoolBoran"/>
+        <a:font script="Knda" typeface="Tunga"/>
+        <a:font script="Guru" typeface="Raavi"/>
+        <a:font script="Cans" typeface="Euphemia"/>
+        <a:font script="Cher" typeface="Plantagenet Cherokee"/>
+        <a:font script="Yiii" typeface="Microsoft Yi Baiti"/>
+        <a:font script="Tibt" typeface="Microsoft Himalaya"/>
+        <a:font script="Thaa" typeface="MV Boli"/>
+        <a:font script="Deva" typeface="Mangal"/>
+        <a:font script="Telu" typeface="Gautami"/>
+        <a:font script="Taml" typeface="Latha"/>
+        <a:font script="Syrc" typeface="Estrangelo Edessa"/>
+        <a:font script="Orya" typeface="Kalinga"/>
+        <a:font script="Mlym" typeface="Kartika"/>
+        <a:font script="Laoo" typeface="DokChampa"/>
+        <a:font script="Sinh" typeface="Iskoola Pota"/>
+        <a:font script="Mong" typeface="Mongolian Baiti"/>
+        <a:font script="Viet" typeface="Times New Roman"/>
+        <a:font script="Uigh" typeface="Microsoft Uighur"/>
+      </a:majorFont>
+      <a:minorFont>
+        <a:latin typeface="Calibri"/>
+        <a:ea typeface=""/>
+        <a:cs typeface=""/>
+        <a:font script="Jpan" typeface="ＭＳ Ｐゴシック"/>
+        <a:font script="Hang" typeface="맑은 고딕"/>
+        <a:font script="Hans" typeface="宋体"/>
+        <a:font script="Hant" typeface="新細明體"/>
+        <a:font script="Arab" typeface="Arial"/>
+        <a:font script="Hebr" typeface="Arial"/>
+        <a:font script="Thai" typeface="Cordia New"/>
+        <a:font script="Ethi" typeface="Nyala"/>
+        <a:font script="Beng" typeface="Vrinda"/>
+        <a:font script="Gujr" typeface="Shruti"/>
+        <a:font script="Khmr" typeface="DaunPenh"/>
+        <a:font script="Knda" typeface="Tunga"/>
+        <a:font script="Guru" typeface="Raavi"/>
+        <a:font script="Cans" typeface="Euphemia"/>
+        <a:font script="Cher" typeface="Plantagenet Cherokee"/>
+        <a:font script="Yiii" typeface="Microsoft Yi Baiti"/>
+        <a:font script="Tibt" typeface="Microsoft Himalaya"/>
+        <a:font script="Thaa" typeface="MV Boli"/>
+        <a:font script="Deva" typeface="Mangal"/>
+        <a:font script="Telu" typeface="Gautami"/>
+        <a:font script="Taml" typeface="Latha"/>
+        <a:font script="Syrc" typeface="Estrangelo Edessa"/>
+        <a:font script="Orya" typeface="Kalinga"/>
+        <a:font script="Mlym" typeface="Kartika"/>
+        <a:font script="Laoo" typeface="DokChampa"/>
+        <a:font script="Sinh" typeface="Iskoola Pota"/>
+        <a:font script="Mong" typeface="Mongolian Baiti"/>
+        <a:font script="Viet" typeface="Arial"/>
+        <a:font script="Uigh" typeface="Microsoft Uighur"/>
+      </a:minorFont>
+    </a:fontScheme>
+    <a:fmtScheme name="Office">
+      <a:fillStyleLst>
+        <a:solidFill>
+          <a:schemeClr val="phClr"/>
+        </a:solidFill>
+        <a:gradFill rotWithShape="1">
+          <a:gsLst>
+            <a:gs pos="0">
+              <a:schemeClr val="phClr">
+                <a:tint val="50000"/>
+                <a:satMod val="300000"/>
+              </a:schemeClr>
+            </a:gs>
+            <a:gs pos="35000">
+              <a:schemeClr val="phClr">
+                <a:tint val="37000"/>
+                <a:satMod val="300000"/>
+              </a:schemeClr>
+            </a:gs>
+            <a:gs pos="100000">
+              <a:schemeClr val="phClr">
+                <a:tint val="15000"/>
+                <a:satMod val="350000"/>
+              </a:schemeClr>
+            </a:gs>
+          </a:gsLst>
+          <a:lin ang="16200000" scaled="1"/>
+        </a:gradFill>
+        <a:gradFill rotWithShape="1">
+          <a:gsLst>
+            <a:gs pos="0">
+              <a:schemeClr val="phClr">
+                <a:shade val="51000"/>
+                <a:satMod val="130000"/>
+              </a:schemeClr>
+            </a:gs>
+            <a:gs pos="80000">
+              <a:schemeClr val="phClr">
+                <a:shade val="93000"/>
+                <a:satMod val="130000"/>
+              </a:schemeClr>
+            </a:gs>
+            <a:gs pos="100000">
+              <a:schemeClr val="phClr">
+                <a:shade val="94000"/>
+                <a:satMod val="135000"/>
+              </a:schemeClr>
+            </a:gs>
+          </a:gsLst>
+          <a:lin ang="16200000" scaled="0"/>
+        </a:gradFill>
+      </a:fillStyleLst>
+      <a:lnStyleLst>
+        <a:ln w="9525" cap="flat" cmpd="sng" algn="ctr">
+          <a:solidFill>
+            <a:schemeClr val="phClr">
+              <a:shade val="95000"/>
+              <a:satMod val="105000"/>
+            </a:schemeClr>
+          </a:solidFill>
+          <a:prstDash val="solid"/>
+        </a:ln>
+        <a:ln w="25400" cap="flat" cmpd="sng" algn="ctr">
+          <a:solidFill>
+            <a:schemeClr val="phClr"/>
+          </a:solidFill>
+          <a:prstDash val="solid"/>
+        </a:ln>
+        <a:ln w="38100" cap="flat" cmpd="sng" algn="ctr">
+          <a:solidFill>
+            <a:schemeClr val="phClr"/>
+          </a:solidFill>
+          <a:prstDash val="solid"/>
+        </a:ln>
+      </a:lnStyleLst>
+      <a:effectStyleLst>
+        <a:effectStyle>
+          <a:effectLst>
+            <a:outerShdw blurRad="40000" dist="20000" dir="5400000" rotWithShape="0">
+              <a:srgbClr val="000000">
+                <a:alpha val="38000"/>
+              </a:srgbClr>
+            </a:outerShdw>
+          </a:effectLst>
+        </a:effectStyle>
+        <a:effectStyle>
+          <a:effectLst>
+            <a:outerShdw blurRad="40000" dist="23000" dir="5400000" rotWithShape="0">
+              <a:srgbClr val="000000">
+                <a:alpha val="35000"/>
+              </a:srgbClr>
+            </a:outerShdw>
+          </a:effectLst>
+        </a:effectStyle>
+        <a:effectStyle>
+          <a:effectLst>
+            <a:outerShdw blurRad="40000" dist="23000" dir="5400000" rotWithShape="0">
+              <a:srgbClr val="000000">
+                <a:alpha val="35000"/>
+              </a:srgbClr>
+            </a:outerShdw>
+          </a:effectLst>
+          <a:scene3d>
+            <a:camera prst="orthographicFront">
+              <a:rot lat="0" lon="0" rev="0"/>
+            </a:camera>
+            <a:lightRig rig="threePt" dir="t">
+              <a:rot lat="0" lon="0" rev="1200000"/>
+            </a:lightRig>
+          </a:scene3d>
+          <a:sp3d>
+            <a:bevelT w="63500" h="25400"/>
+          </a:sp3d>
+        </a:effectStyle>
+      </a:effectStyleLst>
+      <a:bgFillStyleLst>
+        <a:solidFill>
+          <a:schemeClr val="phClr"/>
+        </a:solidFill>
+        <a:gradFill rotWithShape="1">
+          <a:gsLst>
+            <a:gs pos="0">
+              <a:schemeClr val="phClr">
+                <a:tint val="40000"/>
+                <a:satMod val="350000"/>
+              </a:schemeClr>
+            </a:gs>
+            <a:gs pos="40000">
+              <a:schemeClr val="phClr">
+                <a:tint val="45000"/>
+                <a:shade val="99000"/>
+                <a:satMod val="350000"/>
+              </a:schemeClr>
+            </a:gs>
+            <a:gs pos="100000">
+              <a:schemeClr val="phClr">
+                <a:shade val="20000"/>
+                <a:satMod val="255000"/>
+              </a:schemeClr>
+            </a:gs>
+          </a:gsLst>
+          <a:path path="circle">
+            <a:fillToRect l="50000" t="-80000" r="50000" b="180000"/>
+          </a:path>
+        </a:gradFill>
+        <a:gradFill rotWithShape="1">
+          <a:gsLst>
+            <a:gs pos="0">
+              <a:schemeClr val="phClr">
+                <a:tint val="80000"/>
+                <a:satMod val="300000"/>
+              </a:schemeClr>
+            </a:gs>
+            <a:gs pos="100000">
+              <a:schemeClr val="phClr">
+                <a:shade val="30000"/>
+                <a:satMod val="200000"/>
+              </a:schemeClr>
+            </a:gs>
+          </a:gsLst>
+          <a:path path="circle">
+            <a:fillToRect l="50000" t="50000" r="50000" b="50000"/>
+          </a:path>
+        </a:gradFill>
+      </a:bgFillStyleLst>
+    </a:fmtScheme>
+  </a:themeElements>
+  <a:objectDefaults/>
+  <a:extraClrSchemeLst/>
+</a:theme>
 </file>
</xml_diff>